<commit_message>
Included additional review comments on Overview
</commit_message>
<xml_diff>
--- a/DocSources/images/overview-br.pptx
+++ b/DocSources/images/overview-br.pptx
@@ -14959,8 +14959,8 @@
                 </p:nvSpPr>
                 <p:spPr>
                   <a:xfrm>
-                    <a:off x="2840805" y="5350023"/>
-                    <a:ext cx="938416" cy="307777"/>
+                    <a:off x="2420180" y="5350023"/>
+                    <a:ext cx="1215025" cy="307777"/>
                   </a:xfrm>
                   <a:prstGeom prst="rect">
                     <a:avLst/>
@@ -14977,7 +14977,7 @@
                       <a:rPr lang="en-US" sz="1400" dirty="0" smtClean="0">
                         <a:latin typeface="Fujitsu Sans" panose="020B0404060202020204" pitchFamily="34" charset="0"/>
                       </a:rPr>
-                      <a:t>Monitors VM </a:t>
+                      <a:t>Monitors  </a:t>
                     </a:r>
                     <a:endParaRPr lang="en-US" sz="1400" dirty="0">
                       <a:latin typeface="Fujitsu Sans" panose="020B0404060202020204" pitchFamily="34" charset="0"/>
@@ -16466,8 +16466,8 @@
           </p:nvSpPr>
           <p:spPr>
             <a:xfrm>
-              <a:off x="2715769" y="5497487"/>
-              <a:ext cx="920128" cy="307777"/>
+              <a:off x="2440884" y="5497487"/>
+              <a:ext cx="1267020" cy="307777"/>
             </a:xfrm>
             <a:prstGeom prst="rect">
               <a:avLst/>
@@ -16484,7 +16484,7 @@
                 <a:rPr lang="en-US" sz="1400" dirty="0" smtClean="0">
                   <a:latin typeface="Fujitsu Sans" panose="020B0404060202020204" pitchFamily="34" charset="0"/>
                 </a:rPr>
-                <a:t>for Service A </a:t>
+                <a:t>Service A and B </a:t>
               </a:r>
               <a:endParaRPr lang="en-US" sz="1400" dirty="0">
                 <a:latin typeface="Fujitsu Sans" panose="020B0404060202020204" pitchFamily="34" charset="0"/>
@@ -16534,8 +16534,8 @@
           </p:nvSpPr>
           <p:spPr>
             <a:xfrm>
-              <a:off x="5596128" y="2403515"/>
-              <a:ext cx="1535423" cy="233397"/>
+              <a:off x="5580112" y="2403515"/>
+              <a:ext cx="1551439" cy="233397"/>
             </a:xfrm>
             <a:prstGeom prst="rect">
               <a:avLst/>

</xml_diff>